<commit_message>
fully completed design sections except for lemma section which Im waiting for it to first be implemented
</commit_message>
<xml_diff>
--- a/report/figures/validityChecker.pptx
+++ b/report/figures/validityChecker.pptx
@@ -107,6 +107,11 @@
       </a:defRPr>
     </a:lvl9pPr>
   </p:defaultTextStyle>
+  <p:extLst>
+    <p:ext uri="{EFAFB233-063F-42B5-8137-9DF3F51BA10A}">
+      <p15:sldGuideLst xmlns:p15="http://schemas.microsoft.com/office/powerpoint/2012/main"/>
+    </p:ext>
+  </p:extLst>
 </p:presentation>
 </file>
 
@@ -192,7 +197,7 @@
           <a:p>
             <a:fld id="{18644C8F-82B5-8C42-ADA9-A56DEE4C25FC}" type="datetimeFigureOut">
               <a:rPr lang="en-GB" smtClean="0"/>
-              <a:t>08/06/2017</a:t>
+              <a:t>14/06/2017</a:t>
             </a:fld>
             <a:endParaRPr lang="en-GB"/>
           </a:p>
@@ -591,7 +596,7 @@
           <a:p>
             <a:fld id="{FF054447-2EA3-2742-8E49-5DB2A7B4C327}" type="datetimeFigureOut">
               <a:rPr lang="en-GB" smtClean="0"/>
-              <a:t>08/06/2017</a:t>
+              <a:t>14/06/2017</a:t>
             </a:fld>
             <a:endParaRPr lang="en-GB"/>
           </a:p>
@@ -761,7 +766,7 @@
           <a:p>
             <a:fld id="{FF054447-2EA3-2742-8E49-5DB2A7B4C327}" type="datetimeFigureOut">
               <a:rPr lang="en-GB" smtClean="0"/>
-              <a:t>08/06/2017</a:t>
+              <a:t>14/06/2017</a:t>
             </a:fld>
             <a:endParaRPr lang="en-GB"/>
           </a:p>
@@ -941,7 +946,7 @@
           <a:p>
             <a:fld id="{FF054447-2EA3-2742-8E49-5DB2A7B4C327}" type="datetimeFigureOut">
               <a:rPr lang="en-GB" smtClean="0"/>
-              <a:t>08/06/2017</a:t>
+              <a:t>14/06/2017</a:t>
             </a:fld>
             <a:endParaRPr lang="en-GB"/>
           </a:p>
@@ -1111,7 +1116,7 @@
           <a:p>
             <a:fld id="{FF054447-2EA3-2742-8E49-5DB2A7B4C327}" type="datetimeFigureOut">
               <a:rPr lang="en-GB" smtClean="0"/>
-              <a:t>08/06/2017</a:t>
+              <a:t>14/06/2017</a:t>
             </a:fld>
             <a:endParaRPr lang="en-GB"/>
           </a:p>
@@ -1357,7 +1362,7 @@
           <a:p>
             <a:fld id="{FF054447-2EA3-2742-8E49-5DB2A7B4C327}" type="datetimeFigureOut">
               <a:rPr lang="en-GB" smtClean="0"/>
-              <a:t>08/06/2017</a:t>
+              <a:t>14/06/2017</a:t>
             </a:fld>
             <a:endParaRPr lang="en-GB"/>
           </a:p>
@@ -1589,7 +1594,7 @@
           <a:p>
             <a:fld id="{FF054447-2EA3-2742-8E49-5DB2A7B4C327}" type="datetimeFigureOut">
               <a:rPr lang="en-GB" smtClean="0"/>
-              <a:t>08/06/2017</a:t>
+              <a:t>14/06/2017</a:t>
             </a:fld>
             <a:endParaRPr lang="en-GB"/>
           </a:p>
@@ -1956,7 +1961,7 @@
           <a:p>
             <a:fld id="{FF054447-2EA3-2742-8E49-5DB2A7B4C327}" type="datetimeFigureOut">
               <a:rPr lang="en-GB" smtClean="0"/>
-              <a:t>08/06/2017</a:t>
+              <a:t>14/06/2017</a:t>
             </a:fld>
             <a:endParaRPr lang="en-GB"/>
           </a:p>
@@ -2074,7 +2079,7 @@
           <a:p>
             <a:fld id="{FF054447-2EA3-2742-8E49-5DB2A7B4C327}" type="datetimeFigureOut">
               <a:rPr lang="en-GB" smtClean="0"/>
-              <a:t>08/06/2017</a:t>
+              <a:t>14/06/2017</a:t>
             </a:fld>
             <a:endParaRPr lang="en-GB"/>
           </a:p>
@@ -2169,7 +2174,7 @@
           <a:p>
             <a:fld id="{FF054447-2EA3-2742-8E49-5DB2A7B4C327}" type="datetimeFigureOut">
               <a:rPr lang="en-GB" smtClean="0"/>
-              <a:t>08/06/2017</a:t>
+              <a:t>14/06/2017</a:t>
             </a:fld>
             <a:endParaRPr lang="en-GB"/>
           </a:p>
@@ -2446,7 +2451,7 @@
           <a:p>
             <a:fld id="{FF054447-2EA3-2742-8E49-5DB2A7B4C327}" type="datetimeFigureOut">
               <a:rPr lang="en-GB" smtClean="0"/>
-              <a:t>08/06/2017</a:t>
+              <a:t>14/06/2017</a:t>
             </a:fld>
             <a:endParaRPr lang="en-GB"/>
           </a:p>
@@ -2699,7 +2704,7 @@
           <a:p>
             <a:fld id="{FF054447-2EA3-2742-8E49-5DB2A7B4C327}" type="datetimeFigureOut">
               <a:rPr lang="en-GB" smtClean="0"/>
-              <a:t>08/06/2017</a:t>
+              <a:t>14/06/2017</a:t>
             </a:fld>
             <a:endParaRPr lang="en-GB"/>
           </a:p>
@@ -2912,7 +2917,7 @@
           <a:p>
             <a:fld id="{FF054447-2EA3-2742-8E49-5DB2A7B4C327}" type="datetimeFigureOut">
               <a:rPr lang="en-GB" smtClean="0"/>
-              <a:t>08/06/2017</a:t>
+              <a:t>14/06/2017</a:t>
             </a:fld>
             <a:endParaRPr lang="en-GB"/>
           </a:p>
@@ -3471,7 +3476,7 @@
           </p:cNvPicPr>
           <p:nvPr/>
         </p:nvPicPr>
-        <p:blipFill>
+        <p:blipFill rotWithShape="1">
           <a:blip r:embed="rId2">
             <a:extLst>
               <a:ext uri="{28A0092B-C50C-407E-A947-70E740481C1C}">
@@ -3479,14 +3484,13 @@
               </a:ext>
             </a:extLst>
           </a:blip>
-          <a:stretch>
-            <a:fillRect/>
-          </a:stretch>
+          <a:srcRect l="24950" r="25696"/>
+          <a:stretch/>
         </p:blipFill>
         <p:spPr>
           <a:xfrm>
-            <a:off x="6253817" y="1569231"/>
-            <a:ext cx="5294715" cy="3719537"/>
+            <a:off x="6843401" y="480060"/>
+            <a:ext cx="4143547" cy="5897880"/>
           </a:xfrm>
           <a:prstGeom prst="rect">
             <a:avLst/>
@@ -3509,13 +3513,13 @@
               </a:ext>
             </a:extLst>
           </a:blip>
-          <a:srcRect/>
+          <a:srcRect l="26088" r="25555"/>
           <a:stretch/>
         </p:blipFill>
         <p:spPr>
           <a:xfrm>
-            <a:off x="643467" y="1602322"/>
-            <a:ext cx="5294716" cy="3653354"/>
+            <a:off x="1199197" y="480060"/>
+            <a:ext cx="4133314" cy="5897880"/>
           </a:xfrm>
           <a:prstGeom prst="rect">
             <a:avLst/>

</xml_diff>

<commit_message>
updated several images from the design section of the report
</commit_message>
<xml_diff>
--- a/report/figures/validityChecker.pptx
+++ b/report/figures/validityChecker.pptx
@@ -197,7 +197,7 @@
           <a:p>
             <a:fld id="{18644C8F-82B5-8C42-ADA9-A56DEE4C25FC}" type="datetimeFigureOut">
               <a:rPr lang="en-GB" smtClean="0"/>
-              <a:t>14/06/2017</a:t>
+              <a:t>15/06/2017</a:t>
             </a:fld>
             <a:endParaRPr lang="en-GB"/>
           </a:p>
@@ -596,7 +596,7 @@
           <a:p>
             <a:fld id="{FF054447-2EA3-2742-8E49-5DB2A7B4C327}" type="datetimeFigureOut">
               <a:rPr lang="en-GB" smtClean="0"/>
-              <a:t>14/06/2017</a:t>
+              <a:t>15/06/2017</a:t>
             </a:fld>
             <a:endParaRPr lang="en-GB"/>
           </a:p>
@@ -766,7 +766,7 @@
           <a:p>
             <a:fld id="{FF054447-2EA3-2742-8E49-5DB2A7B4C327}" type="datetimeFigureOut">
               <a:rPr lang="en-GB" smtClean="0"/>
-              <a:t>14/06/2017</a:t>
+              <a:t>15/06/2017</a:t>
             </a:fld>
             <a:endParaRPr lang="en-GB"/>
           </a:p>
@@ -946,7 +946,7 @@
           <a:p>
             <a:fld id="{FF054447-2EA3-2742-8E49-5DB2A7B4C327}" type="datetimeFigureOut">
               <a:rPr lang="en-GB" smtClean="0"/>
-              <a:t>14/06/2017</a:t>
+              <a:t>15/06/2017</a:t>
             </a:fld>
             <a:endParaRPr lang="en-GB"/>
           </a:p>
@@ -1116,7 +1116,7 @@
           <a:p>
             <a:fld id="{FF054447-2EA3-2742-8E49-5DB2A7B4C327}" type="datetimeFigureOut">
               <a:rPr lang="en-GB" smtClean="0"/>
-              <a:t>14/06/2017</a:t>
+              <a:t>15/06/2017</a:t>
             </a:fld>
             <a:endParaRPr lang="en-GB"/>
           </a:p>
@@ -1362,7 +1362,7 @@
           <a:p>
             <a:fld id="{FF054447-2EA3-2742-8E49-5DB2A7B4C327}" type="datetimeFigureOut">
               <a:rPr lang="en-GB" smtClean="0"/>
-              <a:t>14/06/2017</a:t>
+              <a:t>15/06/2017</a:t>
             </a:fld>
             <a:endParaRPr lang="en-GB"/>
           </a:p>
@@ -1594,7 +1594,7 @@
           <a:p>
             <a:fld id="{FF054447-2EA3-2742-8E49-5DB2A7B4C327}" type="datetimeFigureOut">
               <a:rPr lang="en-GB" smtClean="0"/>
-              <a:t>14/06/2017</a:t>
+              <a:t>15/06/2017</a:t>
             </a:fld>
             <a:endParaRPr lang="en-GB"/>
           </a:p>
@@ -1961,7 +1961,7 @@
           <a:p>
             <a:fld id="{FF054447-2EA3-2742-8E49-5DB2A7B4C327}" type="datetimeFigureOut">
               <a:rPr lang="en-GB" smtClean="0"/>
-              <a:t>14/06/2017</a:t>
+              <a:t>15/06/2017</a:t>
             </a:fld>
             <a:endParaRPr lang="en-GB"/>
           </a:p>
@@ -2079,7 +2079,7 @@
           <a:p>
             <a:fld id="{FF054447-2EA3-2742-8E49-5DB2A7B4C327}" type="datetimeFigureOut">
               <a:rPr lang="en-GB" smtClean="0"/>
-              <a:t>14/06/2017</a:t>
+              <a:t>15/06/2017</a:t>
             </a:fld>
             <a:endParaRPr lang="en-GB"/>
           </a:p>
@@ -2174,7 +2174,7 @@
           <a:p>
             <a:fld id="{FF054447-2EA3-2742-8E49-5DB2A7B4C327}" type="datetimeFigureOut">
               <a:rPr lang="en-GB" smtClean="0"/>
-              <a:t>14/06/2017</a:t>
+              <a:t>15/06/2017</a:t>
             </a:fld>
             <a:endParaRPr lang="en-GB"/>
           </a:p>
@@ -2451,7 +2451,7 @@
           <a:p>
             <a:fld id="{FF054447-2EA3-2742-8E49-5DB2A7B4C327}" type="datetimeFigureOut">
               <a:rPr lang="en-GB" smtClean="0"/>
-              <a:t>14/06/2017</a:t>
+              <a:t>15/06/2017</a:t>
             </a:fld>
             <a:endParaRPr lang="en-GB"/>
           </a:p>
@@ -2704,7 +2704,7 @@
           <a:p>
             <a:fld id="{FF054447-2EA3-2742-8E49-5DB2A7B4C327}" type="datetimeFigureOut">
               <a:rPr lang="en-GB" smtClean="0"/>
-              <a:t>14/06/2017</a:t>
+              <a:t>15/06/2017</a:t>
             </a:fld>
             <a:endParaRPr lang="en-GB"/>
           </a:p>
@@ -2917,7 +2917,7 @@
           <a:p>
             <a:fld id="{FF054447-2EA3-2742-8E49-5DB2A7B4C327}" type="datetimeFigureOut">
               <a:rPr lang="en-GB" smtClean="0"/>
-              <a:t>14/06/2017</a:t>
+              <a:t>15/06/2017</a:t>
             </a:fld>
             <a:endParaRPr lang="en-GB"/>
           </a:p>
@@ -3324,7 +3324,7 @@
       </p:grpSpPr>
       <p:sp>
         <p:nvSpPr>
-          <p:cNvPr id="32" name="Rectangle 31"/>
+          <p:cNvPr id="43" name="Rectangle 42"/>
           <p:cNvSpPr>
             <a:spLocks noGrp="1" noRot="1" noChangeAspect="1" noMove="1" noResize="1" noEditPoints="1" noAdjustHandles="1" noChangeArrowheads="1" noChangeShapeType="1" noTextEdit="1"/>
           </p:cNvSpPr>
@@ -3355,7 +3355,7 @@
       </p:sp>
       <p:sp>
         <p:nvSpPr>
-          <p:cNvPr id="34" name="Rectangle 33"/>
+          <p:cNvPr id="45" name="Rectangle 44"/>
           <p:cNvSpPr>
             <a:spLocks noGrp="1" noRot="1" noChangeAspect="1" noMove="1" noResize="1" noEditPoints="1" noAdjustHandles="1" noChangeArrowheads="1" noChangeShapeType="1" noTextEdit="1"/>
           </p:cNvSpPr>
@@ -3409,7 +3409,7 @@
       </p:sp>
       <p:sp>
         <p:nvSpPr>
-          <p:cNvPr id="36" name="Rectangle 35"/>
+          <p:cNvPr id="47" name="Rectangle 46"/>
           <p:cNvSpPr>
             <a:spLocks noGrp="1" noRot="1" noChangeAspect="1" noMove="1" noResize="1" noEditPoints="1" noAdjustHandles="1" noChangeArrowheads="1" noChangeShapeType="1" noTextEdit="1"/>
           </p:cNvSpPr>
@@ -3470,7 +3470,7 @@
       </p:sp>
       <p:pic>
         <p:nvPicPr>
-          <p:cNvPr id="3" name="Picture 2"/>
+          <p:cNvPr id="4" name="Picture 3"/>
           <p:cNvPicPr>
             <a:picLocks noChangeAspect="1"/>
           </p:cNvPicPr>
@@ -3484,13 +3484,13 @@
               </a:ext>
             </a:extLst>
           </a:blip>
-          <a:srcRect l="24950" r="25696"/>
+          <a:srcRect b="3487"/>
           <a:stretch/>
         </p:blipFill>
         <p:spPr>
           <a:xfrm>
-            <a:off x="6843401" y="480060"/>
-            <a:ext cx="4143547" cy="5897880"/>
+            <a:off x="6914754" y="661755"/>
+            <a:ext cx="3756080" cy="5534490"/>
           </a:xfrm>
           <a:prstGeom prst="rect">
             <a:avLst/>
@@ -3499,13 +3499,13 @@
       </p:pic>
       <p:pic>
         <p:nvPicPr>
-          <p:cNvPr id="5" name="Picture 4"/>
+          <p:cNvPr id="2" name="Picture 1"/>
           <p:cNvPicPr>
             <a:picLocks noChangeAspect="1"/>
           </p:cNvPicPr>
           <p:nvPr/>
         </p:nvPicPr>
-        <p:blipFill rotWithShape="1">
+        <p:blipFill>
           <a:blip r:embed="rId3">
             <a:extLst>
               <a:ext uri="{28A0092B-C50C-407E-A947-70E740481C1C}">
@@ -3513,13 +3513,14 @@
               </a:ext>
             </a:extLst>
           </a:blip>
-          <a:srcRect l="26088" r="25555"/>
-          <a:stretch/>
+          <a:stretch>
+            <a:fillRect/>
+          </a:stretch>
         </p:blipFill>
         <p:spPr>
           <a:xfrm>
-            <a:off x="1199197" y="480060"/>
-            <a:ext cx="4133314" cy="5897880"/>
+            <a:off x="1278277" y="643466"/>
+            <a:ext cx="4025095" cy="5571066"/>
           </a:xfrm>
           <a:prstGeom prst="rect">
             <a:avLst/>
@@ -3528,7 +3529,7 @@
       </p:pic>
       <p:cxnSp>
         <p:nvCxnSpPr>
-          <p:cNvPr id="38" name="Straight Connector 37"/>
+          <p:cNvPr id="49" name="Straight Connector 48"/>
           <p:cNvCxnSpPr>
             <a:cxnSpLocks noGrp="1" noRot="1" noChangeAspect="1" noMove="1" noResize="1" noEditPoints="1" noAdjustHandles="1" noChangeArrowheads="1" noChangeShapeType="1"/>
           </p:cNvCxnSpPr>
@@ -3572,7 +3573,7 @@
     </p:spTree>
     <p:extLst>
       <p:ext uri="{BB962C8B-B14F-4D97-AF65-F5344CB8AC3E}">
-        <p14:creationId xmlns:p14="http://schemas.microsoft.com/office/powerpoint/2010/main" val="3079669090"/>
+        <p14:creationId xmlns:p14="http://schemas.microsoft.com/office/powerpoint/2010/main" val="2260450894"/>
       </p:ext>
     </p:extLst>
   </p:cSld>

</xml_diff>